<commit_message>
Final Commit for Ethics Presentation
</commit_message>
<xml_diff>
--- a/week_03/day_5/ethics_communication_project/Ethics and Communication.pptx
+++ b/week_03/day_5/ethics_communication_project/Ethics and Communication.pptx
@@ -126,6 +126,7 @@
     <p1510:client id="{7EED5EFB-4A00-4061-9FF1-20A3007B1199}" v="1" dt="2020-11-08T13:35:31.506"/>
     <p1510:client id="{90A22CE4-D63F-462C-96D5-F68ADF7E2FEA}" v="452" dt="2020-11-06T17:48:27.248"/>
     <p1510:client id="{A80BD15E-0A4F-4B3E-8E71-131EBCFF095E}" v="962" dt="2020-11-07T16:02:13.074"/>
+    <p1510:client id="{C8B65F61-55BA-4355-80E5-7C51317CB2DD}" v="718" dt="2020-11-08T21:54:54.256"/>
     <p1510:client id="{C8BE6AA4-F855-4D22-9713-5E528CD9E682}" v="493" dt="2020-11-07T14:57:21.800"/>
   </p1510:revLst>
 </p1510:revInfo>
@@ -496,6 +497,350 @@
     </pc:docChg>
   </pc:docChgLst>
   <pc:docChgLst>
+    <pc:chgData name="Stuart McColl" userId="8c9679bf7ff4b745" providerId="Windows Live" clId="Web-{A80BD15E-0A4F-4B3E-8E71-131EBCFF095E}"/>
+    <pc:docChg chg="addSld delSld modSld">
+      <pc:chgData name="Stuart McColl" userId="8c9679bf7ff4b745" providerId="Windows Live" clId="Web-{A80BD15E-0A4F-4B3E-8E71-131EBCFF095E}" dt="2020-11-07T16:05:06.635" v="952"/>
+      <pc:docMkLst>
+        <pc:docMk/>
+      </pc:docMkLst>
+      <pc:sldChg chg="addSp delSp modSp">
+        <pc:chgData name="Stuart McColl" userId="8c9679bf7ff4b745" providerId="Windows Live" clId="Web-{A80BD15E-0A4F-4B3E-8E71-131EBCFF095E}" dt="2020-11-07T16:05:06.635" v="952"/>
+        <pc:sldMkLst>
+          <pc:docMk/>
+          <pc:sldMk cId="109857222" sldId="256"/>
+        </pc:sldMkLst>
+        <pc:spChg chg="mod">
+          <ac:chgData name="Stuart McColl" userId="8c9679bf7ff4b745" providerId="Windows Live" clId="Web-{A80BD15E-0A4F-4B3E-8E71-131EBCFF095E}" dt="2020-11-07T16:05:06.635" v="952"/>
+          <ac:spMkLst>
+            <pc:docMk/>
+            <pc:sldMk cId="109857222" sldId="256"/>
+            <ac:spMk id="2" creationId="{00000000-0000-0000-0000-000000000000}"/>
+          </ac:spMkLst>
+        </pc:spChg>
+        <pc:spChg chg="mod">
+          <ac:chgData name="Stuart McColl" userId="8c9679bf7ff4b745" providerId="Windows Live" clId="Web-{A80BD15E-0A4F-4B3E-8E71-131EBCFF095E}" dt="2020-11-07T16:05:06.635" v="952"/>
+          <ac:spMkLst>
+            <pc:docMk/>
+            <pc:sldMk cId="109857222" sldId="256"/>
+            <ac:spMk id="3" creationId="{00000000-0000-0000-0000-000000000000}"/>
+          </ac:spMkLst>
+        </pc:spChg>
+        <pc:spChg chg="add del">
+          <ac:chgData name="Stuart McColl" userId="8c9679bf7ff4b745" providerId="Windows Live" clId="Web-{A80BD15E-0A4F-4B3E-8E71-131EBCFF095E}" dt="2020-11-07T16:05:06.635" v="952"/>
+          <ac:spMkLst>
+            <pc:docMk/>
+            <pc:sldMk cId="109857222" sldId="256"/>
+            <ac:spMk id="9" creationId="{11F4D251-B7D8-402D-950A-F9D15396E94B}"/>
+          </ac:spMkLst>
+        </pc:spChg>
+        <pc:spChg chg="add del">
+          <ac:chgData name="Stuart McColl" userId="8c9679bf7ff4b745" providerId="Windows Live" clId="Web-{A80BD15E-0A4F-4B3E-8E71-131EBCFF095E}" dt="2020-11-07T16:05:06.635" v="952"/>
+          <ac:spMkLst>
+            <pc:docMk/>
+            <pc:sldMk cId="109857222" sldId="256"/>
+            <ac:spMk id="11" creationId="{E67870A8-BE17-461C-AD58-035AD7FA02CB}"/>
+          </ac:spMkLst>
+        </pc:spChg>
+        <pc:spChg chg="add">
+          <ac:chgData name="Stuart McColl" userId="8c9679bf7ff4b745" providerId="Windows Live" clId="Web-{A80BD15E-0A4F-4B3E-8E71-131EBCFF095E}" dt="2020-11-07T16:05:06.635" v="952"/>
+          <ac:spMkLst>
+            <pc:docMk/>
+            <pc:sldMk cId="109857222" sldId="256"/>
+            <ac:spMk id="13" creationId="{11F4D251-B7D8-402D-950A-F9D15396E94B}"/>
+          </ac:spMkLst>
+        </pc:spChg>
+        <pc:spChg chg="add">
+          <ac:chgData name="Stuart McColl" userId="8c9679bf7ff4b745" providerId="Windows Live" clId="Web-{A80BD15E-0A4F-4B3E-8E71-131EBCFF095E}" dt="2020-11-07T16:05:06.635" v="952"/>
+          <ac:spMkLst>
+            <pc:docMk/>
+            <pc:sldMk cId="109857222" sldId="256"/>
+            <ac:spMk id="14" creationId="{E67870A8-BE17-461C-AD58-035AD7FA02CB}"/>
+          </ac:spMkLst>
+        </pc:spChg>
+        <pc:spChg chg="add del">
+          <ac:chgData name="Stuart McColl" userId="8c9679bf7ff4b745" providerId="Windows Live" clId="Web-{A80BD15E-0A4F-4B3E-8E71-131EBCFF095E}" dt="2020-11-07T16:05:06.620" v="951"/>
+          <ac:spMkLst>
+            <pc:docMk/>
+            <pc:sldMk cId="109857222" sldId="256"/>
+            <ac:spMk id="16" creationId="{3E760B8C-89FC-4C84-BDDB-42EAB2395F15}"/>
+          </ac:spMkLst>
+        </pc:spChg>
+        <pc:spChg chg="add del">
+          <ac:chgData name="Stuart McColl" userId="8c9679bf7ff4b745" providerId="Windows Live" clId="Web-{A80BD15E-0A4F-4B3E-8E71-131EBCFF095E}" dt="2020-11-07T16:05:06.620" v="951"/>
+          <ac:spMkLst>
+            <pc:docMk/>
+            <pc:sldMk cId="109857222" sldId="256"/>
+            <ac:spMk id="18" creationId="{26D9977B-0E49-40A1-B999-9C80377FCF76}"/>
+          </ac:spMkLst>
+        </pc:spChg>
+        <pc:picChg chg="mod ord">
+          <ac:chgData name="Stuart McColl" userId="8c9679bf7ff4b745" providerId="Windows Live" clId="Web-{A80BD15E-0A4F-4B3E-8E71-131EBCFF095E}" dt="2020-11-07T16:05:06.635" v="952"/>
+          <ac:picMkLst>
+            <pc:docMk/>
+            <pc:sldMk cId="109857222" sldId="256"/>
+            <ac:picMk id="4" creationId="{E47B3C51-1786-48E1-86B4-8356384035A4}"/>
+          </ac:picMkLst>
+        </pc:picChg>
+      </pc:sldChg>
+      <pc:sldChg chg="modSp del">
+        <pc:chgData name="Stuart McColl" userId="8c9679bf7ff4b745" providerId="Windows Live" clId="Web-{A80BD15E-0A4F-4B3E-8E71-131EBCFF095E}" dt="2020-11-07T15:56:19.030" v="853"/>
+        <pc:sldMkLst>
+          <pc:docMk/>
+          <pc:sldMk cId="3909269141" sldId="258"/>
+        </pc:sldMkLst>
+        <pc:spChg chg="mod">
+          <ac:chgData name="Stuart McColl" userId="8c9679bf7ff4b745" providerId="Windows Live" clId="Web-{A80BD15E-0A4F-4B3E-8E71-131EBCFF095E}" dt="2020-11-07T15:53:10.046" v="834" actId="1076"/>
+          <ac:spMkLst>
+            <pc:docMk/>
+            <pc:sldMk cId="3909269141" sldId="258"/>
+            <ac:spMk id="3" creationId="{7564D020-DC59-4677-B255-BA9E1B31C624}"/>
+          </ac:spMkLst>
+        </pc:spChg>
+      </pc:sldChg>
+      <pc:sldChg chg="modSp">
+        <pc:chgData name="Stuart McColl" userId="8c9679bf7ff4b745" providerId="Windows Live" clId="Web-{A80BD15E-0A4F-4B3E-8E71-131EBCFF095E}" dt="2020-11-07T15:58:29.384" v="855" actId="20577"/>
+        <pc:sldMkLst>
+          <pc:docMk/>
+          <pc:sldMk cId="1399924638" sldId="259"/>
+        </pc:sldMkLst>
+        <pc:spChg chg="mod">
+          <ac:chgData name="Stuart McColl" userId="8c9679bf7ff4b745" providerId="Windows Live" clId="Web-{A80BD15E-0A4F-4B3E-8E71-131EBCFF095E}" dt="2020-11-07T15:56:26.640" v="854" actId="1076"/>
+          <ac:spMkLst>
+            <pc:docMk/>
+            <pc:sldMk cId="1399924638" sldId="259"/>
+            <ac:spMk id="2" creationId="{AC5C032F-0A58-4EAA-ADD9-055557EF65D8}"/>
+          </ac:spMkLst>
+        </pc:spChg>
+        <pc:spChg chg="mod">
+          <ac:chgData name="Stuart McColl" userId="8c9679bf7ff4b745" providerId="Windows Live" clId="Web-{A80BD15E-0A4F-4B3E-8E71-131EBCFF095E}" dt="2020-11-07T15:58:29.384" v="855" actId="20577"/>
+          <ac:spMkLst>
+            <pc:docMk/>
+            <pc:sldMk cId="1399924638" sldId="259"/>
+            <ac:spMk id="3" creationId="{C17D9DFD-1CA4-47C0-8717-EA782DBEF62F}"/>
+          </ac:spMkLst>
+        </pc:spChg>
+        <pc:spChg chg="mod">
+          <ac:chgData name="Stuart McColl" userId="8c9679bf7ff4b745" providerId="Windows Live" clId="Web-{A80BD15E-0A4F-4B3E-8E71-131EBCFF095E}" dt="2020-11-07T15:39:33.667" v="739" actId="20577"/>
+          <ac:spMkLst>
+            <pc:docMk/>
+            <pc:sldMk cId="1399924638" sldId="259"/>
+            <ac:spMk id="5" creationId="{13FED35F-0154-4026-99C8-2A7FA055B71F}"/>
+          </ac:spMkLst>
+        </pc:spChg>
+      </pc:sldChg>
+      <pc:sldChg chg="modSp">
+        <pc:chgData name="Stuart McColl" userId="8c9679bf7ff4b745" providerId="Windows Live" clId="Web-{A80BD15E-0A4F-4B3E-8E71-131EBCFF095E}" dt="2020-11-07T16:01:51.369" v="946" actId="20577"/>
+        <pc:sldMkLst>
+          <pc:docMk/>
+          <pc:sldMk cId="3538213627" sldId="260"/>
+        </pc:sldMkLst>
+        <pc:spChg chg="mod">
+          <ac:chgData name="Stuart McColl" userId="8c9679bf7ff4b745" providerId="Windows Live" clId="Web-{A80BD15E-0A4F-4B3E-8E71-131EBCFF095E}" dt="2020-11-07T16:01:51.369" v="946" actId="20577"/>
+          <ac:spMkLst>
+            <pc:docMk/>
+            <pc:sldMk cId="3538213627" sldId="260"/>
+            <ac:spMk id="3" creationId="{A9D40420-F92F-4182-A640-AD9FB17AAD27}"/>
+          </ac:spMkLst>
+        </pc:spChg>
+        <pc:picChg chg="mod">
+          <ac:chgData name="Stuart McColl" userId="8c9679bf7ff4b745" providerId="Windows Live" clId="Web-{A80BD15E-0A4F-4B3E-8E71-131EBCFF095E}" dt="2020-11-07T16:01:38.306" v="943" actId="1076"/>
+          <ac:picMkLst>
+            <pc:docMk/>
+            <pc:sldMk cId="3538213627" sldId="260"/>
+            <ac:picMk id="4" creationId="{8408B063-15D5-4017-B102-EB4122CAD9BA}"/>
+          </ac:picMkLst>
+        </pc:picChg>
+      </pc:sldChg>
+      <pc:sldChg chg="modSp">
+        <pc:chgData name="Stuart McColl" userId="8c9679bf7ff4b745" providerId="Windows Live" clId="Web-{A80BD15E-0A4F-4B3E-8E71-131EBCFF095E}" dt="2020-11-07T16:02:13.074" v="949" actId="1076"/>
+        <pc:sldMkLst>
+          <pc:docMk/>
+          <pc:sldMk cId="3634545645" sldId="261"/>
+        </pc:sldMkLst>
+        <pc:spChg chg="mod">
+          <ac:chgData name="Stuart McColl" userId="8c9679bf7ff4b745" providerId="Windows Live" clId="Web-{A80BD15E-0A4F-4B3E-8E71-131EBCFF095E}" dt="2020-11-07T16:02:13.074" v="949" actId="1076"/>
+          <ac:spMkLst>
+            <pc:docMk/>
+            <pc:sldMk cId="3634545645" sldId="261"/>
+            <ac:spMk id="2" creationId="{05979578-C584-4393-A193-068D039ED53D}"/>
+          </ac:spMkLst>
+        </pc:spChg>
+      </pc:sldChg>
+      <pc:sldChg chg="addSp delSp modSp">
+        <pc:chgData name="Stuart McColl" userId="8c9679bf7ff4b745" providerId="Windows Live" clId="Web-{A80BD15E-0A4F-4B3E-8E71-131EBCFF095E}" dt="2020-11-07T15:42:34.166" v="741" actId="1076"/>
+        <pc:sldMkLst>
+          <pc:docMk/>
+          <pc:sldMk cId="2160010074" sldId="262"/>
+        </pc:sldMkLst>
+        <pc:spChg chg="mod">
+          <ac:chgData name="Stuart McColl" userId="8c9679bf7ff4b745" providerId="Windows Live" clId="Web-{A80BD15E-0A4F-4B3E-8E71-131EBCFF095E}" dt="2020-11-07T15:01:22.761" v="4" actId="1076"/>
+          <ac:spMkLst>
+            <pc:docMk/>
+            <pc:sldMk cId="2160010074" sldId="262"/>
+            <ac:spMk id="2" creationId="{B92E1A5B-1516-41D7-98F2-D17274A15BF5}"/>
+          </ac:spMkLst>
+        </pc:spChg>
+        <pc:spChg chg="del">
+          <ac:chgData name="Stuart McColl" userId="8c9679bf7ff4b745" providerId="Windows Live" clId="Web-{A80BD15E-0A4F-4B3E-8E71-131EBCFF095E}" dt="2020-11-07T15:01:02.384" v="0"/>
+          <ac:spMkLst>
+            <pc:docMk/>
+            <pc:sldMk cId="2160010074" sldId="262"/>
+            <ac:spMk id="3" creationId="{E6F85198-AF0A-4225-B539-283FE508081E}"/>
+          </ac:spMkLst>
+        </pc:spChg>
+        <pc:spChg chg="add mod">
+          <ac:chgData name="Stuart McColl" userId="8c9679bf7ff4b745" providerId="Windows Live" clId="Web-{A80BD15E-0A4F-4B3E-8E71-131EBCFF095E}" dt="2020-11-07T15:06:31.693" v="255" actId="1076"/>
+          <ac:spMkLst>
+            <pc:docMk/>
+            <pc:sldMk cId="2160010074" sldId="262"/>
+            <ac:spMk id="5" creationId="{830C4BFB-6D15-45DE-8ABC-A46EE64C74CA}"/>
+          </ac:spMkLst>
+        </pc:spChg>
+        <pc:picChg chg="add mod ord">
+          <ac:chgData name="Stuart McColl" userId="8c9679bf7ff4b745" providerId="Windows Live" clId="Web-{A80BD15E-0A4F-4B3E-8E71-131EBCFF095E}" dt="2020-11-07T15:42:34.166" v="741" actId="1076"/>
+          <ac:picMkLst>
+            <pc:docMk/>
+            <pc:sldMk cId="2160010074" sldId="262"/>
+            <ac:picMk id="4" creationId="{06F06DE5-DBF1-4E31-AAE5-5A68DE5410AF}"/>
+          </ac:picMkLst>
+        </pc:picChg>
+      </pc:sldChg>
+      <pc:sldChg chg="modSp new">
+        <pc:chgData name="Stuart McColl" userId="8c9679bf7ff4b745" providerId="Windows Live" clId="Web-{A80BD15E-0A4F-4B3E-8E71-131EBCFF095E}" dt="2020-11-07T15:17:57.358" v="553" actId="1076"/>
+        <pc:sldMkLst>
+          <pc:docMk/>
+          <pc:sldMk cId="4243328507" sldId="263"/>
+        </pc:sldMkLst>
+        <pc:spChg chg="mod">
+          <ac:chgData name="Stuart McColl" userId="8c9679bf7ff4b745" providerId="Windows Live" clId="Web-{A80BD15E-0A4F-4B3E-8E71-131EBCFF095E}" dt="2020-11-07T15:11:26.888" v="304" actId="1076"/>
+          <ac:spMkLst>
+            <pc:docMk/>
+            <pc:sldMk cId="4243328507" sldId="263"/>
+            <ac:spMk id="2" creationId="{3E9ED1A7-5830-4057-B0D8-D92A7E57D04D}"/>
+          </ac:spMkLst>
+        </pc:spChg>
+        <pc:spChg chg="mod">
+          <ac:chgData name="Stuart McColl" userId="8c9679bf7ff4b745" providerId="Windows Live" clId="Web-{A80BD15E-0A4F-4B3E-8E71-131EBCFF095E}" dt="2020-11-07T15:17:57.358" v="553" actId="1076"/>
+          <ac:spMkLst>
+            <pc:docMk/>
+            <pc:sldMk cId="4243328507" sldId="263"/>
+            <ac:spMk id="3" creationId="{C2AFE038-AD1B-46EC-80F4-23E29327B964}"/>
+          </ac:spMkLst>
+        </pc:spChg>
+      </pc:sldChg>
+      <pc:sldChg chg="addSp delSp modSp new">
+        <pc:chgData name="Stuart McColl" userId="8c9679bf7ff4b745" providerId="Windows Live" clId="Web-{A80BD15E-0A4F-4B3E-8E71-131EBCFF095E}" dt="2020-11-07T15:30:02.667" v="631" actId="20577"/>
+        <pc:sldMkLst>
+          <pc:docMk/>
+          <pc:sldMk cId="3898274823" sldId="264"/>
+        </pc:sldMkLst>
+        <pc:spChg chg="mod">
+          <ac:chgData name="Stuart McColl" userId="8c9679bf7ff4b745" providerId="Windows Live" clId="Web-{A80BD15E-0A4F-4B3E-8E71-131EBCFF095E}" dt="2020-11-07T15:25:35.051" v="609" actId="1076"/>
+          <ac:spMkLst>
+            <pc:docMk/>
+            <pc:sldMk cId="3898274823" sldId="264"/>
+            <ac:spMk id="2" creationId="{2A55C146-45EB-407E-945A-F31341C1EBD9}"/>
+          </ac:spMkLst>
+        </pc:spChg>
+        <pc:spChg chg="del">
+          <ac:chgData name="Stuart McColl" userId="8c9679bf7ff4b745" providerId="Windows Live" clId="Web-{A80BD15E-0A4F-4B3E-8E71-131EBCFF095E}" dt="2020-11-07T15:22:34.630" v="580"/>
+          <ac:spMkLst>
+            <pc:docMk/>
+            <pc:sldMk cId="3898274823" sldId="264"/>
+            <ac:spMk id="3" creationId="{3251CD50-1661-44BA-BCBD-ECB4F0BD43E8}"/>
+          </ac:spMkLst>
+        </pc:spChg>
+        <pc:spChg chg="add del mod">
+          <ac:chgData name="Stuart McColl" userId="8c9679bf7ff4b745" providerId="Windows Live" clId="Web-{A80BD15E-0A4F-4B3E-8E71-131EBCFF095E}" dt="2020-11-07T15:23:39.792" v="586"/>
+          <ac:spMkLst>
+            <pc:docMk/>
+            <pc:sldMk cId="3898274823" sldId="264"/>
+            <ac:spMk id="6" creationId="{3BCE457D-3E36-4C48-A970-ABD755CC137E}"/>
+          </ac:spMkLst>
+        </pc:spChg>
+        <pc:spChg chg="add mod">
+          <ac:chgData name="Stuart McColl" userId="8c9679bf7ff4b745" providerId="Windows Live" clId="Web-{A80BD15E-0A4F-4B3E-8E71-131EBCFF095E}" dt="2020-11-07T15:30:02.667" v="631" actId="20577"/>
+          <ac:spMkLst>
+            <pc:docMk/>
+            <pc:sldMk cId="3898274823" sldId="264"/>
+            <ac:spMk id="8" creationId="{C4157956-7CF7-4B6D-9F2F-0D1FD82DCAD5}"/>
+          </ac:spMkLst>
+        </pc:spChg>
+        <pc:spChg chg="add del mod">
+          <ac:chgData name="Stuart McColl" userId="8c9679bf7ff4b745" providerId="Windows Live" clId="Web-{A80BD15E-0A4F-4B3E-8E71-131EBCFF095E}" dt="2020-11-07T15:28:58.396" v="620"/>
+          <ac:spMkLst>
+            <pc:docMk/>
+            <pc:sldMk cId="3898274823" sldId="264"/>
+            <ac:spMk id="11" creationId="{D9281268-3A25-43B7-88CC-4B8F43FC28BA}"/>
+          </ac:spMkLst>
+        </pc:spChg>
+        <pc:picChg chg="add del mod ord">
+          <ac:chgData name="Stuart McColl" userId="8c9679bf7ff4b745" providerId="Windows Live" clId="Web-{A80BD15E-0A4F-4B3E-8E71-131EBCFF095E}" dt="2020-11-07T15:23:05.805" v="585"/>
+          <ac:picMkLst>
+            <pc:docMk/>
+            <pc:sldMk cId="3898274823" sldId="264"/>
+            <ac:picMk id="4" creationId="{B655927C-0DD0-427A-97A8-D77F549E4EBE}"/>
+          </ac:picMkLst>
+        </pc:picChg>
+        <pc:picChg chg="add del mod ord">
+          <ac:chgData name="Stuart McColl" userId="8c9679bf7ff4b745" providerId="Windows Live" clId="Web-{A80BD15E-0A4F-4B3E-8E71-131EBCFF095E}" dt="2020-11-07T15:28:47.989" v="617"/>
+          <ac:picMkLst>
+            <pc:docMk/>
+            <pc:sldMk cId="3898274823" sldId="264"/>
+            <ac:picMk id="7" creationId="{A03622CC-FC34-4B2B-B6F0-18FBDE945CD7}"/>
+          </ac:picMkLst>
+        </pc:picChg>
+        <pc:picChg chg="add mod">
+          <ac:chgData name="Stuart McColl" userId="8c9679bf7ff4b745" providerId="Windows Live" clId="Web-{A80BD15E-0A4F-4B3E-8E71-131EBCFF095E}" dt="2020-11-07T15:29:02.709" v="621" actId="1076"/>
+          <ac:picMkLst>
+            <pc:docMk/>
+            <pc:sldMk cId="3898274823" sldId="264"/>
+            <ac:picMk id="9" creationId="{4898EC08-287B-4AD2-B4F7-0DB22781F6F5}"/>
+          </ac:picMkLst>
+        </pc:picChg>
+      </pc:sldChg>
+      <pc:sldChg chg="addSp delSp modSp new">
+        <pc:chgData name="Stuart McColl" userId="8c9679bf7ff4b745" providerId="Windows Live" clId="Web-{A80BD15E-0A4F-4B3E-8E71-131EBCFF095E}" dt="2020-11-07T15:49:11.792" v="833" actId="1076"/>
+        <pc:sldMkLst>
+          <pc:docMk/>
+          <pc:sldMk cId="1217338822" sldId="265"/>
+        </pc:sldMkLst>
+        <pc:spChg chg="mod">
+          <ac:chgData name="Stuart McColl" userId="8c9679bf7ff4b745" providerId="Windows Live" clId="Web-{A80BD15E-0A4F-4B3E-8E71-131EBCFF095E}" dt="2020-11-07T15:36:53.560" v="725" actId="1076"/>
+          <ac:spMkLst>
+            <pc:docMk/>
+            <pc:sldMk cId="1217338822" sldId="265"/>
+            <ac:spMk id="2" creationId="{5530D03A-B0AC-4530-8DA4-4DF7CD53344E}"/>
+          </ac:spMkLst>
+        </pc:spChg>
+        <pc:spChg chg="del">
+          <ac:chgData name="Stuart McColl" userId="8c9679bf7ff4b745" providerId="Windows Live" clId="Web-{A80BD15E-0A4F-4B3E-8E71-131EBCFF095E}" dt="2020-11-07T15:33:10.104" v="634"/>
+          <ac:spMkLst>
+            <pc:docMk/>
+            <pc:sldMk cId="1217338822" sldId="265"/>
+            <ac:spMk id="3" creationId="{81CB70A1-7E62-4FDB-A6F4-9E940226C450}"/>
+          </ac:spMkLst>
+        </pc:spChg>
+        <pc:spChg chg="add mod">
+          <ac:chgData name="Stuart McColl" userId="8c9679bf7ff4b745" providerId="Windows Live" clId="Web-{A80BD15E-0A4F-4B3E-8E71-131EBCFF095E}" dt="2020-11-07T15:48:24.101" v="830" actId="20577"/>
+          <ac:spMkLst>
+            <pc:docMk/>
+            <pc:sldMk cId="1217338822" sldId="265"/>
+            <ac:spMk id="5" creationId="{9FE08A5C-4FDC-487C-91B0-0CCBEA164029}"/>
+          </ac:spMkLst>
+        </pc:spChg>
+        <pc:picChg chg="add mod ord">
+          <ac:chgData name="Stuart McColl" userId="8c9679bf7ff4b745" providerId="Windows Live" clId="Web-{A80BD15E-0A4F-4B3E-8E71-131EBCFF095E}" dt="2020-11-07T15:49:11.792" v="833" actId="1076"/>
+          <ac:picMkLst>
+            <pc:docMk/>
+            <pc:sldMk cId="1217338822" sldId="265"/>
+            <ac:picMk id="4" creationId="{20F9FF1A-F14C-4C5E-A151-9D9CF652B5D3}"/>
+          </ac:picMkLst>
+        </pc:picChg>
+      </pc:sldChg>
+    </pc:docChg>
+  </pc:docChgLst>
+  <pc:docChgLst>
     <pc:chgData name="Stuart McColl" userId="8c9679bf7ff4b745" providerId="Windows Live" clId="Web-{C8BE6AA4-F855-4D22-9713-5E528CD9E682}"/>
     <pc:docChg chg="addSld modSld">
       <pc:chgData name="Stuart McColl" userId="8c9679bf7ff4b745" providerId="Windows Live" clId="Web-{C8BE6AA4-F855-4D22-9713-5E528CD9E682}" dt="2020-11-07T14:57:21.535" v="475" actId="20577"/>
@@ -577,350 +922,6 @@
             <ac:spMk id="2" creationId="{B92E1A5B-1516-41D7-98F2-D17274A15BF5}"/>
           </ac:spMkLst>
         </pc:spChg>
-      </pc:sldChg>
-    </pc:docChg>
-  </pc:docChgLst>
-  <pc:docChgLst>
-    <pc:chgData name="Stuart McColl" userId="8c9679bf7ff4b745" providerId="Windows Live" clId="Web-{A80BD15E-0A4F-4B3E-8E71-131EBCFF095E}"/>
-    <pc:docChg chg="addSld delSld modSld">
-      <pc:chgData name="Stuart McColl" userId="8c9679bf7ff4b745" providerId="Windows Live" clId="Web-{A80BD15E-0A4F-4B3E-8E71-131EBCFF095E}" dt="2020-11-07T16:05:06.635" v="952"/>
-      <pc:docMkLst>
-        <pc:docMk/>
-      </pc:docMkLst>
-      <pc:sldChg chg="addSp delSp modSp">
-        <pc:chgData name="Stuart McColl" userId="8c9679bf7ff4b745" providerId="Windows Live" clId="Web-{A80BD15E-0A4F-4B3E-8E71-131EBCFF095E}" dt="2020-11-07T16:05:06.635" v="952"/>
-        <pc:sldMkLst>
-          <pc:docMk/>
-          <pc:sldMk cId="109857222" sldId="256"/>
-        </pc:sldMkLst>
-        <pc:spChg chg="mod">
-          <ac:chgData name="Stuart McColl" userId="8c9679bf7ff4b745" providerId="Windows Live" clId="Web-{A80BD15E-0A4F-4B3E-8E71-131EBCFF095E}" dt="2020-11-07T16:05:06.635" v="952"/>
-          <ac:spMkLst>
-            <pc:docMk/>
-            <pc:sldMk cId="109857222" sldId="256"/>
-            <ac:spMk id="2" creationId="{00000000-0000-0000-0000-000000000000}"/>
-          </ac:spMkLst>
-        </pc:spChg>
-        <pc:spChg chg="mod">
-          <ac:chgData name="Stuart McColl" userId="8c9679bf7ff4b745" providerId="Windows Live" clId="Web-{A80BD15E-0A4F-4B3E-8E71-131EBCFF095E}" dt="2020-11-07T16:05:06.635" v="952"/>
-          <ac:spMkLst>
-            <pc:docMk/>
-            <pc:sldMk cId="109857222" sldId="256"/>
-            <ac:spMk id="3" creationId="{00000000-0000-0000-0000-000000000000}"/>
-          </ac:spMkLst>
-        </pc:spChg>
-        <pc:spChg chg="add del">
-          <ac:chgData name="Stuart McColl" userId="8c9679bf7ff4b745" providerId="Windows Live" clId="Web-{A80BD15E-0A4F-4B3E-8E71-131EBCFF095E}" dt="2020-11-07T16:05:06.635" v="952"/>
-          <ac:spMkLst>
-            <pc:docMk/>
-            <pc:sldMk cId="109857222" sldId="256"/>
-            <ac:spMk id="9" creationId="{11F4D251-B7D8-402D-950A-F9D15396E94B}"/>
-          </ac:spMkLst>
-        </pc:spChg>
-        <pc:spChg chg="add del">
-          <ac:chgData name="Stuart McColl" userId="8c9679bf7ff4b745" providerId="Windows Live" clId="Web-{A80BD15E-0A4F-4B3E-8E71-131EBCFF095E}" dt="2020-11-07T16:05:06.635" v="952"/>
-          <ac:spMkLst>
-            <pc:docMk/>
-            <pc:sldMk cId="109857222" sldId="256"/>
-            <ac:spMk id="11" creationId="{E67870A8-BE17-461C-AD58-035AD7FA02CB}"/>
-          </ac:spMkLst>
-        </pc:spChg>
-        <pc:spChg chg="add">
-          <ac:chgData name="Stuart McColl" userId="8c9679bf7ff4b745" providerId="Windows Live" clId="Web-{A80BD15E-0A4F-4B3E-8E71-131EBCFF095E}" dt="2020-11-07T16:05:06.635" v="952"/>
-          <ac:spMkLst>
-            <pc:docMk/>
-            <pc:sldMk cId="109857222" sldId="256"/>
-            <ac:spMk id="13" creationId="{11F4D251-B7D8-402D-950A-F9D15396E94B}"/>
-          </ac:spMkLst>
-        </pc:spChg>
-        <pc:spChg chg="add">
-          <ac:chgData name="Stuart McColl" userId="8c9679bf7ff4b745" providerId="Windows Live" clId="Web-{A80BD15E-0A4F-4B3E-8E71-131EBCFF095E}" dt="2020-11-07T16:05:06.635" v="952"/>
-          <ac:spMkLst>
-            <pc:docMk/>
-            <pc:sldMk cId="109857222" sldId="256"/>
-            <ac:spMk id="14" creationId="{E67870A8-BE17-461C-AD58-035AD7FA02CB}"/>
-          </ac:spMkLst>
-        </pc:spChg>
-        <pc:spChg chg="add del">
-          <ac:chgData name="Stuart McColl" userId="8c9679bf7ff4b745" providerId="Windows Live" clId="Web-{A80BD15E-0A4F-4B3E-8E71-131EBCFF095E}" dt="2020-11-07T16:05:06.620" v="951"/>
-          <ac:spMkLst>
-            <pc:docMk/>
-            <pc:sldMk cId="109857222" sldId="256"/>
-            <ac:spMk id="16" creationId="{3E760B8C-89FC-4C84-BDDB-42EAB2395F15}"/>
-          </ac:spMkLst>
-        </pc:spChg>
-        <pc:spChg chg="add del">
-          <ac:chgData name="Stuart McColl" userId="8c9679bf7ff4b745" providerId="Windows Live" clId="Web-{A80BD15E-0A4F-4B3E-8E71-131EBCFF095E}" dt="2020-11-07T16:05:06.620" v="951"/>
-          <ac:spMkLst>
-            <pc:docMk/>
-            <pc:sldMk cId="109857222" sldId="256"/>
-            <ac:spMk id="18" creationId="{26D9977B-0E49-40A1-B999-9C80377FCF76}"/>
-          </ac:spMkLst>
-        </pc:spChg>
-        <pc:picChg chg="mod ord">
-          <ac:chgData name="Stuart McColl" userId="8c9679bf7ff4b745" providerId="Windows Live" clId="Web-{A80BD15E-0A4F-4B3E-8E71-131EBCFF095E}" dt="2020-11-07T16:05:06.635" v="952"/>
-          <ac:picMkLst>
-            <pc:docMk/>
-            <pc:sldMk cId="109857222" sldId="256"/>
-            <ac:picMk id="4" creationId="{E47B3C51-1786-48E1-86B4-8356384035A4}"/>
-          </ac:picMkLst>
-        </pc:picChg>
-      </pc:sldChg>
-      <pc:sldChg chg="modSp del">
-        <pc:chgData name="Stuart McColl" userId="8c9679bf7ff4b745" providerId="Windows Live" clId="Web-{A80BD15E-0A4F-4B3E-8E71-131EBCFF095E}" dt="2020-11-07T15:56:19.030" v="853"/>
-        <pc:sldMkLst>
-          <pc:docMk/>
-          <pc:sldMk cId="3909269141" sldId="258"/>
-        </pc:sldMkLst>
-        <pc:spChg chg="mod">
-          <ac:chgData name="Stuart McColl" userId="8c9679bf7ff4b745" providerId="Windows Live" clId="Web-{A80BD15E-0A4F-4B3E-8E71-131EBCFF095E}" dt="2020-11-07T15:53:10.046" v="834" actId="1076"/>
-          <ac:spMkLst>
-            <pc:docMk/>
-            <pc:sldMk cId="3909269141" sldId="258"/>
-            <ac:spMk id="3" creationId="{7564D020-DC59-4677-B255-BA9E1B31C624}"/>
-          </ac:spMkLst>
-        </pc:spChg>
-      </pc:sldChg>
-      <pc:sldChg chg="modSp">
-        <pc:chgData name="Stuart McColl" userId="8c9679bf7ff4b745" providerId="Windows Live" clId="Web-{A80BD15E-0A4F-4B3E-8E71-131EBCFF095E}" dt="2020-11-07T15:58:29.384" v="855" actId="20577"/>
-        <pc:sldMkLst>
-          <pc:docMk/>
-          <pc:sldMk cId="1399924638" sldId="259"/>
-        </pc:sldMkLst>
-        <pc:spChg chg="mod">
-          <ac:chgData name="Stuart McColl" userId="8c9679bf7ff4b745" providerId="Windows Live" clId="Web-{A80BD15E-0A4F-4B3E-8E71-131EBCFF095E}" dt="2020-11-07T15:56:26.640" v="854" actId="1076"/>
-          <ac:spMkLst>
-            <pc:docMk/>
-            <pc:sldMk cId="1399924638" sldId="259"/>
-            <ac:spMk id="2" creationId="{AC5C032F-0A58-4EAA-ADD9-055557EF65D8}"/>
-          </ac:spMkLst>
-        </pc:spChg>
-        <pc:spChg chg="mod">
-          <ac:chgData name="Stuart McColl" userId="8c9679bf7ff4b745" providerId="Windows Live" clId="Web-{A80BD15E-0A4F-4B3E-8E71-131EBCFF095E}" dt="2020-11-07T15:58:29.384" v="855" actId="20577"/>
-          <ac:spMkLst>
-            <pc:docMk/>
-            <pc:sldMk cId="1399924638" sldId="259"/>
-            <ac:spMk id="3" creationId="{C17D9DFD-1CA4-47C0-8717-EA782DBEF62F}"/>
-          </ac:spMkLst>
-        </pc:spChg>
-        <pc:spChg chg="mod">
-          <ac:chgData name="Stuart McColl" userId="8c9679bf7ff4b745" providerId="Windows Live" clId="Web-{A80BD15E-0A4F-4B3E-8E71-131EBCFF095E}" dt="2020-11-07T15:39:33.667" v="739" actId="20577"/>
-          <ac:spMkLst>
-            <pc:docMk/>
-            <pc:sldMk cId="1399924638" sldId="259"/>
-            <ac:spMk id="5" creationId="{13FED35F-0154-4026-99C8-2A7FA055B71F}"/>
-          </ac:spMkLst>
-        </pc:spChg>
-      </pc:sldChg>
-      <pc:sldChg chg="modSp">
-        <pc:chgData name="Stuart McColl" userId="8c9679bf7ff4b745" providerId="Windows Live" clId="Web-{A80BD15E-0A4F-4B3E-8E71-131EBCFF095E}" dt="2020-11-07T16:01:51.369" v="946" actId="20577"/>
-        <pc:sldMkLst>
-          <pc:docMk/>
-          <pc:sldMk cId="3538213627" sldId="260"/>
-        </pc:sldMkLst>
-        <pc:spChg chg="mod">
-          <ac:chgData name="Stuart McColl" userId="8c9679bf7ff4b745" providerId="Windows Live" clId="Web-{A80BD15E-0A4F-4B3E-8E71-131EBCFF095E}" dt="2020-11-07T16:01:51.369" v="946" actId="20577"/>
-          <ac:spMkLst>
-            <pc:docMk/>
-            <pc:sldMk cId="3538213627" sldId="260"/>
-            <ac:spMk id="3" creationId="{A9D40420-F92F-4182-A640-AD9FB17AAD27}"/>
-          </ac:spMkLst>
-        </pc:spChg>
-        <pc:picChg chg="mod">
-          <ac:chgData name="Stuart McColl" userId="8c9679bf7ff4b745" providerId="Windows Live" clId="Web-{A80BD15E-0A4F-4B3E-8E71-131EBCFF095E}" dt="2020-11-07T16:01:38.306" v="943" actId="1076"/>
-          <ac:picMkLst>
-            <pc:docMk/>
-            <pc:sldMk cId="3538213627" sldId="260"/>
-            <ac:picMk id="4" creationId="{8408B063-15D5-4017-B102-EB4122CAD9BA}"/>
-          </ac:picMkLst>
-        </pc:picChg>
-      </pc:sldChg>
-      <pc:sldChg chg="modSp">
-        <pc:chgData name="Stuart McColl" userId="8c9679bf7ff4b745" providerId="Windows Live" clId="Web-{A80BD15E-0A4F-4B3E-8E71-131EBCFF095E}" dt="2020-11-07T16:02:13.074" v="949" actId="1076"/>
-        <pc:sldMkLst>
-          <pc:docMk/>
-          <pc:sldMk cId="3634545645" sldId="261"/>
-        </pc:sldMkLst>
-        <pc:spChg chg="mod">
-          <ac:chgData name="Stuart McColl" userId="8c9679bf7ff4b745" providerId="Windows Live" clId="Web-{A80BD15E-0A4F-4B3E-8E71-131EBCFF095E}" dt="2020-11-07T16:02:13.074" v="949" actId="1076"/>
-          <ac:spMkLst>
-            <pc:docMk/>
-            <pc:sldMk cId="3634545645" sldId="261"/>
-            <ac:spMk id="2" creationId="{05979578-C584-4393-A193-068D039ED53D}"/>
-          </ac:spMkLst>
-        </pc:spChg>
-      </pc:sldChg>
-      <pc:sldChg chg="addSp delSp modSp">
-        <pc:chgData name="Stuart McColl" userId="8c9679bf7ff4b745" providerId="Windows Live" clId="Web-{A80BD15E-0A4F-4B3E-8E71-131EBCFF095E}" dt="2020-11-07T15:42:34.166" v="741" actId="1076"/>
-        <pc:sldMkLst>
-          <pc:docMk/>
-          <pc:sldMk cId="2160010074" sldId="262"/>
-        </pc:sldMkLst>
-        <pc:spChg chg="mod">
-          <ac:chgData name="Stuart McColl" userId="8c9679bf7ff4b745" providerId="Windows Live" clId="Web-{A80BD15E-0A4F-4B3E-8E71-131EBCFF095E}" dt="2020-11-07T15:01:22.761" v="4" actId="1076"/>
-          <ac:spMkLst>
-            <pc:docMk/>
-            <pc:sldMk cId="2160010074" sldId="262"/>
-            <ac:spMk id="2" creationId="{B92E1A5B-1516-41D7-98F2-D17274A15BF5}"/>
-          </ac:spMkLst>
-        </pc:spChg>
-        <pc:spChg chg="del">
-          <ac:chgData name="Stuart McColl" userId="8c9679bf7ff4b745" providerId="Windows Live" clId="Web-{A80BD15E-0A4F-4B3E-8E71-131EBCFF095E}" dt="2020-11-07T15:01:02.384" v="0"/>
-          <ac:spMkLst>
-            <pc:docMk/>
-            <pc:sldMk cId="2160010074" sldId="262"/>
-            <ac:spMk id="3" creationId="{E6F85198-AF0A-4225-B539-283FE508081E}"/>
-          </ac:spMkLst>
-        </pc:spChg>
-        <pc:spChg chg="add mod">
-          <ac:chgData name="Stuart McColl" userId="8c9679bf7ff4b745" providerId="Windows Live" clId="Web-{A80BD15E-0A4F-4B3E-8E71-131EBCFF095E}" dt="2020-11-07T15:06:31.693" v="255" actId="1076"/>
-          <ac:spMkLst>
-            <pc:docMk/>
-            <pc:sldMk cId="2160010074" sldId="262"/>
-            <ac:spMk id="5" creationId="{830C4BFB-6D15-45DE-8ABC-A46EE64C74CA}"/>
-          </ac:spMkLst>
-        </pc:spChg>
-        <pc:picChg chg="add mod ord">
-          <ac:chgData name="Stuart McColl" userId="8c9679bf7ff4b745" providerId="Windows Live" clId="Web-{A80BD15E-0A4F-4B3E-8E71-131EBCFF095E}" dt="2020-11-07T15:42:34.166" v="741" actId="1076"/>
-          <ac:picMkLst>
-            <pc:docMk/>
-            <pc:sldMk cId="2160010074" sldId="262"/>
-            <ac:picMk id="4" creationId="{06F06DE5-DBF1-4E31-AAE5-5A68DE5410AF}"/>
-          </ac:picMkLst>
-        </pc:picChg>
-      </pc:sldChg>
-      <pc:sldChg chg="modSp new">
-        <pc:chgData name="Stuart McColl" userId="8c9679bf7ff4b745" providerId="Windows Live" clId="Web-{A80BD15E-0A4F-4B3E-8E71-131EBCFF095E}" dt="2020-11-07T15:17:57.358" v="553" actId="1076"/>
-        <pc:sldMkLst>
-          <pc:docMk/>
-          <pc:sldMk cId="4243328507" sldId="263"/>
-        </pc:sldMkLst>
-        <pc:spChg chg="mod">
-          <ac:chgData name="Stuart McColl" userId="8c9679bf7ff4b745" providerId="Windows Live" clId="Web-{A80BD15E-0A4F-4B3E-8E71-131EBCFF095E}" dt="2020-11-07T15:11:26.888" v="304" actId="1076"/>
-          <ac:spMkLst>
-            <pc:docMk/>
-            <pc:sldMk cId="4243328507" sldId="263"/>
-            <ac:spMk id="2" creationId="{3E9ED1A7-5830-4057-B0D8-D92A7E57D04D}"/>
-          </ac:spMkLst>
-        </pc:spChg>
-        <pc:spChg chg="mod">
-          <ac:chgData name="Stuart McColl" userId="8c9679bf7ff4b745" providerId="Windows Live" clId="Web-{A80BD15E-0A4F-4B3E-8E71-131EBCFF095E}" dt="2020-11-07T15:17:57.358" v="553" actId="1076"/>
-          <ac:spMkLst>
-            <pc:docMk/>
-            <pc:sldMk cId="4243328507" sldId="263"/>
-            <ac:spMk id="3" creationId="{C2AFE038-AD1B-46EC-80F4-23E29327B964}"/>
-          </ac:spMkLst>
-        </pc:spChg>
-      </pc:sldChg>
-      <pc:sldChg chg="addSp delSp modSp new">
-        <pc:chgData name="Stuart McColl" userId="8c9679bf7ff4b745" providerId="Windows Live" clId="Web-{A80BD15E-0A4F-4B3E-8E71-131EBCFF095E}" dt="2020-11-07T15:30:02.667" v="631" actId="20577"/>
-        <pc:sldMkLst>
-          <pc:docMk/>
-          <pc:sldMk cId="3898274823" sldId="264"/>
-        </pc:sldMkLst>
-        <pc:spChg chg="mod">
-          <ac:chgData name="Stuart McColl" userId="8c9679bf7ff4b745" providerId="Windows Live" clId="Web-{A80BD15E-0A4F-4B3E-8E71-131EBCFF095E}" dt="2020-11-07T15:25:35.051" v="609" actId="1076"/>
-          <ac:spMkLst>
-            <pc:docMk/>
-            <pc:sldMk cId="3898274823" sldId="264"/>
-            <ac:spMk id="2" creationId="{2A55C146-45EB-407E-945A-F31341C1EBD9}"/>
-          </ac:spMkLst>
-        </pc:spChg>
-        <pc:spChg chg="del">
-          <ac:chgData name="Stuart McColl" userId="8c9679bf7ff4b745" providerId="Windows Live" clId="Web-{A80BD15E-0A4F-4B3E-8E71-131EBCFF095E}" dt="2020-11-07T15:22:34.630" v="580"/>
-          <ac:spMkLst>
-            <pc:docMk/>
-            <pc:sldMk cId="3898274823" sldId="264"/>
-            <ac:spMk id="3" creationId="{3251CD50-1661-44BA-BCBD-ECB4F0BD43E8}"/>
-          </ac:spMkLst>
-        </pc:spChg>
-        <pc:spChg chg="add del mod">
-          <ac:chgData name="Stuart McColl" userId="8c9679bf7ff4b745" providerId="Windows Live" clId="Web-{A80BD15E-0A4F-4B3E-8E71-131EBCFF095E}" dt="2020-11-07T15:23:39.792" v="586"/>
-          <ac:spMkLst>
-            <pc:docMk/>
-            <pc:sldMk cId="3898274823" sldId="264"/>
-            <ac:spMk id="6" creationId="{3BCE457D-3E36-4C48-A970-ABD755CC137E}"/>
-          </ac:spMkLst>
-        </pc:spChg>
-        <pc:spChg chg="add mod">
-          <ac:chgData name="Stuart McColl" userId="8c9679bf7ff4b745" providerId="Windows Live" clId="Web-{A80BD15E-0A4F-4B3E-8E71-131EBCFF095E}" dt="2020-11-07T15:30:02.667" v="631" actId="20577"/>
-          <ac:spMkLst>
-            <pc:docMk/>
-            <pc:sldMk cId="3898274823" sldId="264"/>
-            <ac:spMk id="8" creationId="{C4157956-7CF7-4B6D-9F2F-0D1FD82DCAD5}"/>
-          </ac:spMkLst>
-        </pc:spChg>
-        <pc:spChg chg="add del mod">
-          <ac:chgData name="Stuart McColl" userId="8c9679bf7ff4b745" providerId="Windows Live" clId="Web-{A80BD15E-0A4F-4B3E-8E71-131EBCFF095E}" dt="2020-11-07T15:28:58.396" v="620"/>
-          <ac:spMkLst>
-            <pc:docMk/>
-            <pc:sldMk cId="3898274823" sldId="264"/>
-            <ac:spMk id="11" creationId="{D9281268-3A25-43B7-88CC-4B8F43FC28BA}"/>
-          </ac:spMkLst>
-        </pc:spChg>
-        <pc:picChg chg="add del mod ord">
-          <ac:chgData name="Stuart McColl" userId="8c9679bf7ff4b745" providerId="Windows Live" clId="Web-{A80BD15E-0A4F-4B3E-8E71-131EBCFF095E}" dt="2020-11-07T15:23:05.805" v="585"/>
-          <ac:picMkLst>
-            <pc:docMk/>
-            <pc:sldMk cId="3898274823" sldId="264"/>
-            <ac:picMk id="4" creationId="{B655927C-0DD0-427A-97A8-D77F549E4EBE}"/>
-          </ac:picMkLst>
-        </pc:picChg>
-        <pc:picChg chg="add del mod ord">
-          <ac:chgData name="Stuart McColl" userId="8c9679bf7ff4b745" providerId="Windows Live" clId="Web-{A80BD15E-0A4F-4B3E-8E71-131EBCFF095E}" dt="2020-11-07T15:28:47.989" v="617"/>
-          <ac:picMkLst>
-            <pc:docMk/>
-            <pc:sldMk cId="3898274823" sldId="264"/>
-            <ac:picMk id="7" creationId="{A03622CC-FC34-4B2B-B6F0-18FBDE945CD7}"/>
-          </ac:picMkLst>
-        </pc:picChg>
-        <pc:picChg chg="add mod">
-          <ac:chgData name="Stuart McColl" userId="8c9679bf7ff4b745" providerId="Windows Live" clId="Web-{A80BD15E-0A4F-4B3E-8E71-131EBCFF095E}" dt="2020-11-07T15:29:02.709" v="621" actId="1076"/>
-          <ac:picMkLst>
-            <pc:docMk/>
-            <pc:sldMk cId="3898274823" sldId="264"/>
-            <ac:picMk id="9" creationId="{4898EC08-287B-4AD2-B4F7-0DB22781F6F5}"/>
-          </ac:picMkLst>
-        </pc:picChg>
-      </pc:sldChg>
-      <pc:sldChg chg="addSp delSp modSp new">
-        <pc:chgData name="Stuart McColl" userId="8c9679bf7ff4b745" providerId="Windows Live" clId="Web-{A80BD15E-0A4F-4B3E-8E71-131EBCFF095E}" dt="2020-11-07T15:49:11.792" v="833" actId="1076"/>
-        <pc:sldMkLst>
-          <pc:docMk/>
-          <pc:sldMk cId="1217338822" sldId="265"/>
-        </pc:sldMkLst>
-        <pc:spChg chg="mod">
-          <ac:chgData name="Stuart McColl" userId="8c9679bf7ff4b745" providerId="Windows Live" clId="Web-{A80BD15E-0A4F-4B3E-8E71-131EBCFF095E}" dt="2020-11-07T15:36:53.560" v="725" actId="1076"/>
-          <ac:spMkLst>
-            <pc:docMk/>
-            <pc:sldMk cId="1217338822" sldId="265"/>
-            <ac:spMk id="2" creationId="{5530D03A-B0AC-4530-8DA4-4DF7CD53344E}"/>
-          </ac:spMkLst>
-        </pc:spChg>
-        <pc:spChg chg="del">
-          <ac:chgData name="Stuart McColl" userId="8c9679bf7ff4b745" providerId="Windows Live" clId="Web-{A80BD15E-0A4F-4B3E-8E71-131EBCFF095E}" dt="2020-11-07T15:33:10.104" v="634"/>
-          <ac:spMkLst>
-            <pc:docMk/>
-            <pc:sldMk cId="1217338822" sldId="265"/>
-            <ac:spMk id="3" creationId="{81CB70A1-7E62-4FDB-A6F4-9E940226C450}"/>
-          </ac:spMkLst>
-        </pc:spChg>
-        <pc:spChg chg="add mod">
-          <ac:chgData name="Stuart McColl" userId="8c9679bf7ff4b745" providerId="Windows Live" clId="Web-{A80BD15E-0A4F-4B3E-8E71-131EBCFF095E}" dt="2020-11-07T15:48:24.101" v="830" actId="20577"/>
-          <ac:spMkLst>
-            <pc:docMk/>
-            <pc:sldMk cId="1217338822" sldId="265"/>
-            <ac:spMk id="5" creationId="{9FE08A5C-4FDC-487C-91B0-0CCBEA164029}"/>
-          </ac:spMkLst>
-        </pc:spChg>
-        <pc:picChg chg="add mod ord">
-          <ac:chgData name="Stuart McColl" userId="8c9679bf7ff4b745" providerId="Windows Live" clId="Web-{A80BD15E-0A4F-4B3E-8E71-131EBCFF095E}" dt="2020-11-07T15:49:11.792" v="833" actId="1076"/>
-          <ac:picMkLst>
-            <pc:docMk/>
-            <pc:sldMk cId="1217338822" sldId="265"/>
-            <ac:picMk id="4" creationId="{20F9FF1A-F14C-4C5E-A151-9D9CF652B5D3}"/>
-          </ac:picMkLst>
-        </pc:picChg>
       </pc:sldChg>
     </pc:docChg>
   </pc:docChgLst>
@@ -945,6 +946,75 @@
             <ac:picMk id="4" creationId="{E47B3C51-1786-48E1-86B4-8356384035A4}"/>
           </ac:picMkLst>
         </pc:picChg>
+      </pc:sldChg>
+    </pc:docChg>
+  </pc:docChgLst>
+  <pc:docChgLst>
+    <pc:chgData name="Stuart McColl" userId="8c9679bf7ff4b745" providerId="Windows Live" clId="Web-{C8B65F61-55BA-4355-80E5-7C51317CB2DD}"/>
+    <pc:docChg chg="modSld">
+      <pc:chgData name="Stuart McColl" userId="8c9679bf7ff4b745" providerId="Windows Live" clId="Web-{C8B65F61-55BA-4355-80E5-7C51317CB2DD}" dt="2020-11-08T21:54:54.256" v="717" actId="20577"/>
+      <pc:docMkLst>
+        <pc:docMk/>
+      </pc:docMkLst>
+      <pc:sldChg chg="modSp">
+        <pc:chgData name="Stuart McColl" userId="8c9679bf7ff4b745" providerId="Windows Live" clId="Web-{C8B65F61-55BA-4355-80E5-7C51317CB2DD}" dt="2020-11-08T21:46:38.289" v="676" actId="20577"/>
+        <pc:sldMkLst>
+          <pc:docMk/>
+          <pc:sldMk cId="3634545645" sldId="261"/>
+        </pc:sldMkLst>
+        <pc:spChg chg="mod">
+          <ac:chgData name="Stuart McColl" userId="8c9679bf7ff4b745" providerId="Windows Live" clId="Web-{C8B65F61-55BA-4355-80E5-7C51317CB2DD}" dt="2020-11-08T21:46:38.289" v="676" actId="20577"/>
+          <ac:spMkLst>
+            <pc:docMk/>
+            <pc:sldMk cId="3634545645" sldId="261"/>
+            <ac:spMk id="3" creationId="{6128731E-87CD-4503-B296-1CB9B2DAA35F}"/>
+          </ac:spMkLst>
+        </pc:spChg>
+      </pc:sldChg>
+      <pc:sldChg chg="modSp">
+        <pc:chgData name="Stuart McColl" userId="8c9679bf7ff4b745" providerId="Windows Live" clId="Web-{C8B65F61-55BA-4355-80E5-7C51317CB2DD}" dt="2020-11-08T21:51:44.151" v="699" actId="20577"/>
+        <pc:sldMkLst>
+          <pc:docMk/>
+          <pc:sldMk cId="2160010074" sldId="262"/>
+        </pc:sldMkLst>
+        <pc:spChg chg="mod">
+          <ac:chgData name="Stuart McColl" userId="8c9679bf7ff4b745" providerId="Windows Live" clId="Web-{C8B65F61-55BA-4355-80E5-7C51317CB2DD}" dt="2020-11-08T21:51:44.151" v="699" actId="20577"/>
+          <ac:spMkLst>
+            <pc:docMk/>
+            <pc:sldMk cId="2160010074" sldId="262"/>
+            <ac:spMk id="5" creationId="{830C4BFB-6D15-45DE-8ABC-A46EE64C74CA}"/>
+          </ac:spMkLst>
+        </pc:spChg>
+      </pc:sldChg>
+      <pc:sldChg chg="modSp">
+        <pc:chgData name="Stuart McColl" userId="8c9679bf7ff4b745" providerId="Windows Live" clId="Web-{C8B65F61-55BA-4355-80E5-7C51317CB2DD}" dt="2020-11-08T21:39:47.593" v="434" actId="20577"/>
+        <pc:sldMkLst>
+          <pc:docMk/>
+          <pc:sldMk cId="3898274823" sldId="264"/>
+        </pc:sldMkLst>
+        <pc:spChg chg="mod">
+          <ac:chgData name="Stuart McColl" userId="8c9679bf7ff4b745" providerId="Windows Live" clId="Web-{C8B65F61-55BA-4355-80E5-7C51317CB2DD}" dt="2020-11-08T21:39:47.593" v="434" actId="20577"/>
+          <ac:spMkLst>
+            <pc:docMk/>
+            <pc:sldMk cId="3898274823" sldId="264"/>
+            <ac:spMk id="8" creationId="{C4157956-7CF7-4B6D-9F2F-0D1FD82DCAD5}"/>
+          </ac:spMkLst>
+        </pc:spChg>
+      </pc:sldChg>
+      <pc:sldChg chg="modSp">
+        <pc:chgData name="Stuart McColl" userId="8c9679bf7ff4b745" providerId="Windows Live" clId="Web-{C8B65F61-55BA-4355-80E5-7C51317CB2DD}" dt="2020-11-08T21:54:27.427" v="715" actId="20577"/>
+        <pc:sldMkLst>
+          <pc:docMk/>
+          <pc:sldMk cId="1217338822" sldId="265"/>
+        </pc:sldMkLst>
+        <pc:spChg chg="mod">
+          <ac:chgData name="Stuart McColl" userId="8c9679bf7ff4b745" providerId="Windows Live" clId="Web-{C8B65F61-55BA-4355-80E5-7C51317CB2DD}" dt="2020-11-08T21:54:27.427" v="715" actId="20577"/>
+          <ac:spMkLst>
+            <pc:docMk/>
+            <pc:sldMk cId="1217338822" sldId="265"/>
+            <ac:spMk id="5" creationId="{9FE08A5C-4FDC-487C-91B0-0CCBEA164029}"/>
+          </ac:spMkLst>
+        </pc:spChg>
       </pc:sldChg>
     </pc:docChg>
   </pc:docChgLst>
@@ -5814,12 +5884,12 @@
         <p:spPr>
           <a:xfrm>
             <a:off x="720000" y="2186876"/>
-            <a:ext cx="10728325" cy="3227375"/>
+            <a:ext cx="2898775" cy="3227375"/>
           </a:xfrm>
         </p:spPr>
         <p:txBody>
           <a:bodyPr vert="horz" lIns="0" tIns="0" rIns="0" bIns="0" rtlCol="0" anchor="t">
-            <a:normAutofit/>
+            <a:noAutofit/>
           </a:bodyPr>
           <a:lstStyle/>
           <a:p>
@@ -5832,53 +5902,23 @@
                   <a:srgbClr val="FFFFFF"/>
                 </a:solidFill>
               </a:rPr>
-              <a:t>One possible solution</a:t>
-            </a:r>
-          </a:p>
-          <a:p>
-            <a:pPr marL="0" indent="0">
-              <a:buNone/>
-            </a:pPr>
+              <a:t>One possible solution would be to learn from other industries and to incorporate the membership into an institution as part of the </a:t>
+            </a:r>
+            <a:r>
+              <a:rPr lang="en-GB">
+                <a:solidFill>
+                  <a:srgbClr val="FFFFFF"/>
+                </a:solidFill>
+              </a:rPr>
+              <a:t>journey to becoming a </a:t>
+            </a:r>
             <a:r>
               <a:rPr lang="en-GB" dirty="0">
                 <a:solidFill>
                   <a:srgbClr val="FFFFFF"/>
                 </a:solidFill>
               </a:rPr>
-              <a:t>would be to learn from </a:t>
-            </a:r>
-          </a:p>
-          <a:p>
-            <a:pPr marL="0" indent="0">
-              <a:buNone/>
-            </a:pPr>
-            <a:r>
-              <a:rPr lang="en-GB" dirty="0">
-                <a:solidFill>
-                  <a:srgbClr val="FFFFFF"/>
-                </a:solidFill>
-              </a:rPr>
-              <a:t>other industries and</a:t>
-            </a:r>
-            <a:endParaRPr lang="en-GB" dirty="0">
-              <a:solidFill>
-                <a:srgbClr val="FFFFFF">
-                  <a:alpha val="58000"/>
-                </a:srgbClr>
-              </a:solidFill>
-            </a:endParaRPr>
-          </a:p>
-          <a:p>
-            <a:pPr marL="0" indent="0">
-              <a:buNone/>
-            </a:pPr>
-            <a:r>
-              <a:rPr lang="en-GB" dirty="0">
-                <a:solidFill>
-                  <a:srgbClr val="FFFFFF"/>
-                </a:solidFill>
-              </a:rPr>
-              <a:t>start an institution.</a:t>
+              <a:t>data scientist.</a:t>
             </a:r>
             <a:endParaRPr lang="en-GB" dirty="0">
               <a:solidFill>
@@ -6290,7 +6330,7 @@
         <p:spPr>
           <a:xfrm>
             <a:off x="6981825" y="1323975"/>
-            <a:ext cx="3409950" cy="4154984"/>
+            <a:ext cx="3409950" cy="3785652"/>
           </a:xfrm>
           <a:prstGeom prst="rect">
             <a:avLst/>
@@ -6326,13 +6366,16 @@
                 <a:ea typeface="+mn-lt"/>
                 <a:cs typeface="+mn-lt"/>
               </a:rPr>
-              <a:t>In order to become a member, you must complete an Assessment of Professional Competence (APC).</a:t>
+              <a:t>In order to become a member, you must complete an Assessment of Professional </a:t>
+            </a:r>
+            <a:r>
+              <a:rPr lang="en-GB" sz="2400">
+                <a:ea typeface="+mn-lt"/>
+                <a:cs typeface="+mn-lt"/>
+              </a:rPr>
+              <a:t>Competence (APC).</a:t>
             </a:r>
             <a:endParaRPr lang="en-US" sz="2400"/>
-          </a:p>
-          <a:p>
-            <a:pPr algn="l"/>
-            <a:endParaRPr lang="en-GB" sz="2400" dirty="0"/>
           </a:p>
         </p:txBody>
       </p:sp>
@@ -6634,8 +6677,8 @@
         </p:nvSpPr>
         <p:spPr>
           <a:xfrm>
-            <a:off x="5391150" y="1647825"/>
-            <a:ext cx="5381625" cy="4801314"/>
+            <a:off x="5305425" y="1943100"/>
+            <a:ext cx="5381625" cy="2585323"/>
           </a:xfrm>
           <a:prstGeom prst="rect">
             <a:avLst/>
@@ -6652,158 +6695,48 @@
           <a:lstStyle/>
           <a:p>
             <a:r>
-              <a:rPr lang="en-GB" dirty="0">
+              <a:rPr lang="en-GB"/>
+              <a:t>One place to start would be the </a:t>
+            </a:r>
+            <a:r>
+              <a:rPr lang="en-GB" dirty="0"/>
+              <a:t>Insitute of </a:t>
+            </a:r>
+            <a:r>
+              <a:rPr lang="en-GB"/>
+              <a:t>Analytics (IOA) and to grow its membership. </a:t>
+            </a:r>
+            <a:r>
+              <a:rPr lang="en-GB" dirty="0"/>
+              <a:t>Currently they have 4,500 members worldwide.</a:t>
+            </a:r>
+          </a:p>
+          <a:p>
+            <a:endParaRPr lang="en-GB" dirty="0"/>
+          </a:p>
+          <a:p>
+            <a:r>
+              <a:rPr lang="en-GB">
                 <a:ea typeface="+mn-lt"/>
                 <a:cs typeface="+mn-lt"/>
               </a:rPr>
-              <a:t>One place to start would be the </a:t>
-            </a:r>
-            <a:r>
-              <a:rPr lang="en-GB" b="1" dirty="0">
+              <a:t>Another place to start would be the </a:t>
+            </a:r>
+            <a:r>
+              <a:rPr lang="en-GB" b="1">
                 <a:ea typeface="+mn-lt"/>
                 <a:cs typeface="+mn-lt"/>
               </a:rPr>
-              <a:t>Code of Conduct for Professional Data Scientists</a:t>
-            </a:r>
-            <a:r>
-              <a:rPr lang="en-GB" dirty="0">
+              <a:t>Code of Conduct for Professional Data Scientists</a:t>
+            </a:r>
+            <a:r>
+              <a:rPr lang="en-GB">
                 <a:ea typeface="+mn-lt"/>
                 <a:cs typeface="+mn-lt"/>
               </a:rPr>
-              <a:t>.  </a:t>
-            </a:r>
-            <a:endParaRPr lang="en-US" dirty="0"/>
-          </a:p>
-          <a:p>
-            <a:br>
-              <a:rPr lang="en-US" dirty="0"/>
-            </a:br>
-            <a:endParaRPr lang="en-US" dirty="0"/>
-          </a:p>
-          <a:p>
-            <a:r>
-              <a:rPr lang="en-GB" dirty="0">
-                <a:ea typeface="+mn-lt"/>
-                <a:cs typeface="+mn-lt"/>
-              </a:rPr>
-              <a:t>This code of conduct is a joint initiative between Oxford University and the University of Granada and its </a:t>
-            </a:r>
-            <a:r>
-              <a:rPr lang="en-GB" b="1" dirty="0">
-                <a:ea typeface="+mn-lt"/>
-                <a:cs typeface="+mn-lt"/>
-              </a:rPr>
-              <a:t>key features</a:t>
-            </a:r>
-            <a:r>
-              <a:rPr lang="en-GB" dirty="0">
-                <a:ea typeface="+mn-lt"/>
-                <a:cs typeface="+mn-lt"/>
-              </a:rPr>
-              <a:t> are:</a:t>
-            </a:r>
-            <a:endParaRPr lang="en-GB" dirty="0"/>
-          </a:p>
-          <a:p>
-            <a:br>
-              <a:rPr lang="en-US" dirty="0"/>
-            </a:br>
-            <a:endParaRPr lang="en-US" dirty="0"/>
-          </a:p>
-          <a:p>
-            <a:pPr marL="285750" indent="-285750">
-              <a:buFont typeface="Arial"/>
-              <a:buChar char="•"/>
-            </a:pPr>
-            <a:r>
-              <a:rPr lang="en-GB" dirty="0">
-                <a:ea typeface="+mn-lt"/>
-                <a:cs typeface="+mn-lt"/>
-              </a:rPr>
-              <a:t>Lawfulness</a:t>
-            </a:r>
-            <a:endParaRPr lang="en-GB" dirty="0"/>
-          </a:p>
-          <a:p>
-            <a:pPr marL="285750" indent="-285750">
-              <a:buFont typeface="Arial"/>
-              <a:buChar char="•"/>
-            </a:pPr>
-            <a:r>
-              <a:rPr lang="en-GB" dirty="0">
-                <a:ea typeface="+mn-lt"/>
-                <a:cs typeface="+mn-lt"/>
-              </a:rPr>
-              <a:t>Competence</a:t>
-            </a:r>
-            <a:endParaRPr lang="en-GB" dirty="0"/>
-          </a:p>
-          <a:p>
-            <a:pPr marL="285750" indent="-285750">
-              <a:buFont typeface="Arial"/>
-              <a:buChar char="•"/>
-            </a:pPr>
-            <a:r>
-              <a:rPr lang="en-GB" dirty="0">
-                <a:ea typeface="+mn-lt"/>
-                <a:cs typeface="+mn-lt"/>
-              </a:rPr>
-              <a:t>Dealing with Data</a:t>
-            </a:r>
-            <a:endParaRPr lang="en-GB" dirty="0"/>
-          </a:p>
-          <a:p>
-            <a:pPr marL="285750" indent="-285750">
-              <a:buFont typeface="Arial"/>
-              <a:buChar char="•"/>
-            </a:pPr>
-            <a:r>
-              <a:rPr lang="en-GB" dirty="0">
-                <a:ea typeface="+mn-lt"/>
-                <a:cs typeface="+mn-lt"/>
-              </a:rPr>
-              <a:t>Algorithms and Models</a:t>
-            </a:r>
-            <a:endParaRPr lang="en-GB" dirty="0"/>
-          </a:p>
-          <a:p>
-            <a:pPr marL="285750" indent="-285750">
-              <a:buFont typeface="Arial"/>
-              <a:buChar char="•"/>
-            </a:pPr>
-            <a:r>
-              <a:rPr lang="en-GB" dirty="0">
-                <a:ea typeface="+mn-lt"/>
-                <a:cs typeface="+mn-lt"/>
-              </a:rPr>
-              <a:t>Transparency</a:t>
-            </a:r>
-            <a:endParaRPr lang="en-GB" dirty="0"/>
-          </a:p>
-          <a:p>
-            <a:pPr marL="285750" indent="-285750">
-              <a:buFont typeface="Arial"/>
-              <a:buChar char="•"/>
-            </a:pPr>
-            <a:r>
-              <a:rPr lang="en-GB" dirty="0">
-                <a:ea typeface="+mn-lt"/>
-                <a:cs typeface="+mn-lt"/>
-              </a:rPr>
-              <a:t>Ethical challenges</a:t>
-            </a:r>
-            <a:endParaRPr lang="en-GB" dirty="0"/>
-          </a:p>
-          <a:p>
-            <a:pPr marL="285750" indent="-285750">
-              <a:buFont typeface="Arial"/>
-              <a:buChar char="•"/>
-            </a:pPr>
+              <a:t>.  This code of conduct is a joint initiative between Oxford University and the University of Granada.</a:t>
+            </a:r>
             <a:endParaRPr lang="en-GB"/>
-          </a:p>
-          <a:p>
-            <a:pPr algn="l"/>
-            <a:endParaRPr lang="en-GB" dirty="0"/>
           </a:p>
         </p:txBody>
       </p:sp>
@@ -6943,8 +6876,8 @@
         </p:nvSpPr>
         <p:spPr>
           <a:xfrm>
-            <a:off x="5857875" y="1381125"/>
-            <a:ext cx="4867275" cy="4524315"/>
+            <a:off x="5953125" y="990600"/>
+            <a:ext cx="4867275" cy="5632311"/>
           </a:xfrm>
           <a:prstGeom prst="rect">
             <a:avLst/>
@@ -6965,15 +6898,45 @@
                 <a:ea typeface="+mn-lt"/>
                 <a:cs typeface="+mn-lt"/>
               </a:rPr>
-              <a:t>In my personal opinion, I believe setting up an institute for data scientists would be a great idea.</a:t>
-            </a:r>
-            <a:endParaRPr lang="en-US" dirty="0"/>
-          </a:p>
-          <a:p>
+              <a:t>In my personal opinion, I believe it would be a good idea to have a mandatory code of </a:t>
+            </a:r>
+            <a:r>
+              <a:rPr lang="en-GB">
+                <a:ea typeface="+mn-lt"/>
+                <a:cs typeface="+mn-lt"/>
+              </a:rPr>
+              <a:t>conduct for all data scientists. </a:t>
+            </a:r>
+            <a:endParaRPr lang="en-GB" dirty="0">
+              <a:ea typeface="+mn-lt"/>
+              <a:cs typeface="+mn-lt"/>
+            </a:endParaRPr>
+          </a:p>
+          <a:p>
+            <a:endParaRPr lang="en-GB" dirty="0">
+              <a:ea typeface="+mn-lt"/>
+              <a:cs typeface="+mn-lt"/>
+            </a:endParaRPr>
+          </a:p>
+          <a:p>
+            <a:r>
+              <a:rPr lang="en-GB" dirty="0">
+                <a:ea typeface="+mn-lt"/>
+                <a:cs typeface="+mn-lt"/>
+              </a:rPr>
+              <a:t>I also believe that joining an institution should very much be part of the journey into </a:t>
+            </a:r>
+            <a:r>
+              <a:rPr lang="en-GB">
+                <a:ea typeface="+mn-lt"/>
+                <a:cs typeface="+mn-lt"/>
+              </a:rPr>
+              <a:t>data science as they can uphold the code of conduct.</a:t>
+            </a:r>
             <a:br>
               <a:rPr lang="en-US" dirty="0"/>
             </a:br>
-            <a:endParaRPr lang="en-US" dirty="0"/>
+            <a:endParaRPr lang="en-US"/>
           </a:p>
           <a:p>
             <a:r>

</xml_diff>